<commit_message>
PPT Phase 1 Updated
</commit_message>
<xml_diff>
--- a/Phase-1.pptx
+++ b/Phase-1.pptx
@@ -20,24 +20,25 @@
   <p:notesSz cx="6858000" cy="9144000"/>
   <p:embeddedFontLst>
     <p:embeddedFont>
-      <p:font typeface="Nunito Bold" panose="020B0604020202020204" charset="0"/>
+      <p:font typeface="Nunito Bold" panose="00000800000000000000" pitchFamily="2" charset="0"/>
       <p:regular r:id="rId12"/>
+      <p:bold r:id="rId13"/>
     </p:embeddedFont>
     <p:embeddedFont>
-      <p:font typeface="PT Sans" panose="020B0503020203020204" pitchFamily="34" charset="0"/>
-      <p:regular r:id="rId13"/>
-      <p:bold r:id="rId14"/>
-      <p:italic r:id="rId15"/>
-      <p:boldItalic r:id="rId16"/>
+      <p:font typeface="PT Sans" panose="020F0502020204030204" pitchFamily="34" charset="0"/>
+      <p:regular r:id="rId14"/>
+      <p:bold r:id="rId15"/>
+      <p:italic r:id="rId16"/>
+      <p:boldItalic r:id="rId17"/>
     </p:embeddedFont>
     <p:embeddedFont>
-      <p:font typeface="PT Sans Bold" panose="020B0703020203020204" pitchFamily="34" charset="0"/>
-      <p:regular r:id="rId17"/>
-      <p:bold r:id="rId18"/>
+      <p:font typeface="PT Sans Bold" panose="020B0604020202020204" charset="0"/>
+      <p:regular r:id="rId18"/>
+      <p:bold r:id="rId19"/>
     </p:embeddedFont>
     <p:embeddedFont>
       <p:font typeface="PT Sans Italics" panose="020B0604020202020204" charset="0"/>
-      <p:regular r:id="rId19"/>
+      <p:regular r:id="rId20"/>
     </p:embeddedFont>
   </p:embeddedFontLst>
   <p:defaultTextStyle>
@@ -3234,7 +3235,7 @@
               </a:lnSpc>
             </a:pPr>
             <a:r>
-              <a:rPr lang="en-US" sz="5500" b="1" dirty="0">
+              <a:rPr lang="en-US" sz="5500" b="1" dirty="0" err="1">
                 <a:solidFill>
                   <a:srgbClr val="00002E"/>
                 </a:solidFill>
@@ -3243,8 +3244,17 @@
                 <a:cs typeface="Nunito Bold"/>
                 <a:sym typeface="Nunito Bold"/>
               </a:rPr>
-              <a:t>Sentinel-LEWS</a:t>
-            </a:r>
+              <a:t>LandSense</a:t>
+            </a:r>
+            <a:endParaRPr lang="en-US" sz="5500" b="1" dirty="0">
+              <a:solidFill>
+                <a:srgbClr val="00002E"/>
+              </a:solidFill>
+              <a:latin typeface="Nunito Bold"/>
+              <a:ea typeface="Nunito Bold"/>
+              <a:cs typeface="Nunito Bold"/>
+              <a:sym typeface="Nunito Bold"/>
+            </a:endParaRPr>
           </a:p>
         </p:txBody>
       </p:sp>

</xml_diff>